<commit_message>
Added an example of named, optional arguments to the slides.
</commit_message>
<xml_diff>
--- a/alpha.pptx
+++ b/alpha.pptx
@@ -115,6 +115,11 @@
       </a:defRPr>
     </a:lvl9pPr>
   </p:defaultTextStyle>
+  <p:extLst>
+    <p:ext uri="{EFAFB233-063F-42B5-8137-9DF3F51BA10A}">
+      <p15:sldGuideLst xmlns:p15="http://schemas.microsoft.com/office/powerpoint/2012/main"/>
+    </p:ext>
+  </p:extLst>
 </p:presentation>
 </file>
 
@@ -286,7 +291,7 @@
           <a:p>
             <a:fld id="{BBE45D9D-5AF5-4545-9C1E-48B18DBC10BA}" type="datetimeFigureOut">
               <a:rPr lang="en-US" smtClean="0"/>
-              <a:t>10/22/2025</a:t>
+              <a:t>10/23/2025</a:t>
             </a:fld>
             <a:endParaRPr lang="en-US"/>
           </a:p>
@@ -391,6 +396,13 @@
             <a:schemeClr val="lt1"/>
           </a:fontRef>
         </p:style>
+        <p:txBody>
+          <a:bodyPr/>
+          <a:lstStyle/>
+          <a:p>
+            <a:endParaRPr lang="en-US"/>
+          </a:p>
+        </p:txBody>
       </p:sp>
     </p:spTree>
     <p:extLst>
@@ -514,7 +526,7 @@
           <a:p>
             <a:fld id="{BBE45D9D-5AF5-4545-9C1E-48B18DBC10BA}" type="datetimeFigureOut">
               <a:rPr lang="en-US" smtClean="0"/>
-              <a:t>10/22/2025</a:t>
+              <a:t>10/23/2025</a:t>
             </a:fld>
             <a:endParaRPr lang="en-US"/>
           </a:p>
@@ -694,7 +706,7 @@
           <a:p>
             <a:fld id="{BBE45D9D-5AF5-4545-9C1E-48B18DBC10BA}" type="datetimeFigureOut">
               <a:rPr lang="en-US" smtClean="0"/>
-              <a:t>10/22/2025</a:t>
+              <a:t>10/23/2025</a:t>
             </a:fld>
             <a:endParaRPr lang="en-US"/>
           </a:p>
@@ -864,7 +876,7 @@
           <a:p>
             <a:fld id="{BBE45D9D-5AF5-4545-9C1E-48B18DBC10BA}" type="datetimeFigureOut">
               <a:rPr lang="en-US" smtClean="0"/>
-              <a:t>10/22/2025</a:t>
+              <a:t>10/23/2025</a:t>
             </a:fld>
             <a:endParaRPr lang="en-US"/>
           </a:p>
@@ -1118,7 +1130,7 @@
           <a:p>
             <a:fld id="{BBE45D9D-5AF5-4545-9C1E-48B18DBC10BA}" type="datetimeFigureOut">
               <a:rPr lang="en-US" smtClean="0"/>
-              <a:t>10/22/2025</a:t>
+              <a:t>10/23/2025</a:t>
             </a:fld>
             <a:endParaRPr lang="en-US"/>
           </a:p>
@@ -1444,7 +1456,7 @@
           <a:p>
             <a:fld id="{BBE45D9D-5AF5-4545-9C1E-48B18DBC10BA}" type="datetimeFigureOut">
               <a:rPr lang="en-US" smtClean="0"/>
-              <a:t>10/22/2025</a:t>
+              <a:t>10/23/2025</a:t>
             </a:fld>
             <a:endParaRPr lang="en-US"/>
           </a:p>
@@ -1895,7 +1907,7 @@
           <a:p>
             <a:fld id="{BBE45D9D-5AF5-4545-9C1E-48B18DBC10BA}" type="datetimeFigureOut">
               <a:rPr lang="en-US" smtClean="0"/>
-              <a:t>10/22/2025</a:t>
+              <a:t>10/23/2025</a:t>
             </a:fld>
             <a:endParaRPr lang="en-US"/>
           </a:p>
@@ -2013,7 +2025,7 @@
           <a:p>
             <a:fld id="{BBE45D9D-5AF5-4545-9C1E-48B18DBC10BA}" type="datetimeFigureOut">
               <a:rPr lang="en-US" smtClean="0"/>
-              <a:t>10/22/2025</a:t>
+              <a:t>10/23/2025</a:t>
             </a:fld>
             <a:endParaRPr lang="en-US"/>
           </a:p>
@@ -2108,7 +2120,7 @@
           <a:p>
             <a:fld id="{BBE45D9D-5AF5-4545-9C1E-48B18DBC10BA}" type="datetimeFigureOut">
               <a:rPr lang="en-US" smtClean="0"/>
-              <a:t>10/22/2025</a:t>
+              <a:t>10/23/2025</a:t>
             </a:fld>
             <a:endParaRPr lang="en-US"/>
           </a:p>
@@ -2395,7 +2407,7 @@
           <a:p>
             <a:fld id="{BBE45D9D-5AF5-4545-9C1E-48B18DBC10BA}" type="datetimeFigureOut">
               <a:rPr lang="en-US" smtClean="0"/>
-              <a:t>10/22/2025</a:t>
+              <a:t>10/23/2025</a:t>
             </a:fld>
             <a:endParaRPr lang="en-US"/>
           </a:p>
@@ -2717,7 +2729,7 @@
           <a:p>
             <a:fld id="{BBE45D9D-5AF5-4545-9C1E-48B18DBC10BA}" type="datetimeFigureOut">
               <a:rPr lang="en-US" smtClean="0"/>
-              <a:t>10/22/2025</a:t>
+              <a:t>10/23/2025</a:t>
             </a:fld>
             <a:endParaRPr lang="en-US"/>
           </a:p>
@@ -2839,6 +2851,13 @@
             <a:schemeClr val="lt1"/>
           </a:fontRef>
         </p:style>
+        <p:txBody>
+          <a:bodyPr/>
+          <a:lstStyle/>
+          <a:p>
+            <a:endParaRPr lang="en-US"/>
+          </a:p>
+        </p:txBody>
       </p:sp>
       <p:sp>
         <p:nvSpPr>
@@ -2971,7 +2990,7 @@
           <a:p>
             <a:fld id="{BBE45D9D-5AF5-4545-9C1E-48B18DBC10BA}" type="datetimeFigureOut">
               <a:rPr lang="en-US" smtClean="0"/>
-              <a:t>10/22/2025</a:t>
+              <a:t>10/23/2025</a:t>
             </a:fld>
             <a:endParaRPr lang="en-US"/>
           </a:p>
@@ -4209,37 +4228,45 @@
           <a:lstStyle/>
           <a:p>
             <a:r>
-              <a:rPr lang="en-US" dirty="0"/>
+              <a:rPr lang="en-US"/>
               <a:t>Arguments</a:t>
             </a:r>
-          </a:p>
-        </p:txBody>
-      </p:sp>
-      <p:sp>
-        <p:nvSpPr>
-          <p:cNvPr id="3" name="Content Placeholder 2">
+            <a:endParaRPr lang="en-US" dirty="0"/>
+          </a:p>
+        </p:txBody>
+      </p:sp>
+      <p:pic>
+        <p:nvPicPr>
+          <p:cNvPr id="5" name="Content Placeholder 4">
             <a:extLst>
               <a:ext uri="{FF2B5EF4-FFF2-40B4-BE49-F238E27FC236}">
-                <a16:creationId xmlns:a16="http://schemas.microsoft.com/office/drawing/2014/main" id="{C1761588-2748-0D05-502C-361A66910EE7}"/>
+                <a16:creationId xmlns:a16="http://schemas.microsoft.com/office/drawing/2014/main" id="{810E5CB8-3392-9849-0F50-95F08BEF1D84}"/>
               </a:ext>
             </a:extLst>
           </p:cNvPr>
-          <p:cNvSpPr>
-            <a:spLocks noGrp="1"/>
-          </p:cNvSpPr>
+          <p:cNvPicPr>
+            <a:picLocks noGrp="1" noChangeAspect="1"/>
+          </p:cNvPicPr>
           <p:nvPr>
             <p:ph idx="1"/>
           </p:nvPr>
-        </p:nvSpPr>
-        <p:spPr/>
-        <p:txBody>
-          <a:bodyPr/>
-          <a:lstStyle/>
-          <a:p>
-            <a:endParaRPr lang="en-US" dirty="0"/>
-          </a:p>
-        </p:txBody>
-      </p:sp>
+        </p:nvPicPr>
+        <p:blipFill>
+          <a:blip r:embed="rId2"/>
+          <a:stretch>
+            <a:fillRect/>
+          </a:stretch>
+        </p:blipFill>
+        <p:spPr>
+          <a:xfrm>
+            <a:off x="1262063" y="1844046"/>
+            <a:ext cx="8594725" cy="4320845"/>
+          </a:xfrm>
+          <a:prstGeom prst="rect">
+            <a:avLst/>
+          </a:prstGeom>
+        </p:spPr>
+      </p:pic>
     </p:spTree>
     <p:extLst>
       <p:ext uri="{BB962C8B-B14F-4D97-AF65-F5344CB8AC3E}">

</xml_diff>